<commit_message>
Small update to the .ppt
</commit_message>
<xml_diff>
--- a/docs/Early Bus Departure Prevention.pptx
+++ b/docs/Early Bus Departure Prevention.pptx
@@ -246,7 +246,7 @@
           <a:p>
             <a:fld id="{0E738C4D-AF1E-4DC9-8FE9-85E50A7E97DE}" type="datetimeFigureOut">
               <a:rPr lang="en-US" smtClean="0"/>
-              <a:t>7/9/2024</a:t>
+              <a:t>8/7/2024</a:t>
             </a:fld>
             <a:endParaRPr lang="en-US"/>
           </a:p>
@@ -423,7 +423,7 @@
           <a:p>
             <a:fld id="{AF9D00F9-37E0-414B-A5D7-8830657E9799}" type="datetimeFigureOut">
               <a:rPr lang="en-US" smtClean="0"/>
-              <a:t>7/9/2024</a:t>
+              <a:t>8/7/2024</a:t>
             </a:fld>
             <a:endParaRPr lang="en-US"/>
           </a:p>
@@ -869,7 +869,7 @@
           <a:p>
             <a:fld id="{2088200C-90A2-48FC-AA1E-540CFF77CC40}" type="datetime1">
               <a:rPr lang="en-US" smtClean="0"/>
-              <a:t>7/9/2024</a:t>
+              <a:t>8/7/2024</a:t>
             </a:fld>
             <a:endParaRPr lang="en-US"/>
           </a:p>
@@ -1037,7 +1037,7 @@
           <a:p>
             <a:fld id="{C5E8AA1D-CDE9-40EE-B78F-8F9ABFE39A61}" type="datetime1">
               <a:rPr lang="en-US" smtClean="0"/>
-              <a:t>7/9/2024</a:t>
+              <a:t>8/7/2024</a:t>
             </a:fld>
             <a:endParaRPr lang="en-US"/>
           </a:p>
@@ -1220,7 +1220,7 @@
           <a:p>
             <a:fld id="{D3174943-E5CE-4F29-991B-A6373BF3B5CC}" type="datetime1">
               <a:rPr lang="en-US" smtClean="0"/>
-              <a:t>7/9/2024</a:t>
+              <a:t>8/7/2024</a:t>
             </a:fld>
             <a:endParaRPr lang="en-US"/>
           </a:p>
@@ -1388,7 +1388,7 @@
           <a:p>
             <a:fld id="{6134F75E-CD18-442A-841F-D4BBC45D3F10}" type="datetime1">
               <a:rPr lang="en-US" smtClean="0"/>
-              <a:t>7/9/2024</a:t>
+              <a:t>8/7/2024</a:t>
             </a:fld>
             <a:endParaRPr lang="en-US"/>
           </a:p>
@@ -1638,7 +1638,7 @@
           <a:p>
             <a:fld id="{53B79A40-C76A-4F13-B416-CC0FBEAE438D}" type="datetime1">
               <a:rPr lang="en-US" smtClean="0"/>
-              <a:t>7/9/2024</a:t>
+              <a:t>8/7/2024</a:t>
             </a:fld>
             <a:endParaRPr lang="en-US"/>
           </a:p>
@@ -1923,7 +1923,7 @@
           <a:p>
             <a:fld id="{DD8EB8E2-A7B4-46C9-A695-1B1EB50B6764}" type="datetime1">
               <a:rPr lang="en-US" smtClean="0"/>
-              <a:t>7/9/2024</a:t>
+              <a:t>8/7/2024</a:t>
             </a:fld>
             <a:endParaRPr lang="en-US"/>
           </a:p>
@@ -2342,7 +2342,7 @@
           <a:p>
             <a:fld id="{793140DB-689D-4240-9457-2BB77DC75F8B}" type="datetime1">
               <a:rPr lang="en-US" smtClean="0"/>
-              <a:t>7/9/2024</a:t>
+              <a:t>8/7/2024</a:t>
             </a:fld>
             <a:endParaRPr lang="en-US"/>
           </a:p>
@@ -2459,7 +2459,7 @@
           <a:p>
             <a:fld id="{5B71C299-45F0-463F-8483-E61B520BE6C0}" type="datetime1">
               <a:rPr lang="en-US" smtClean="0"/>
-              <a:t>7/9/2024</a:t>
+              <a:t>8/7/2024</a:t>
             </a:fld>
             <a:endParaRPr lang="en-US"/>
           </a:p>
@@ -2554,7 +2554,7 @@
           <a:p>
             <a:fld id="{C0A99DF1-2264-4F3C-8B40-02019CAB980F}" type="datetime1">
               <a:rPr lang="en-US" smtClean="0"/>
-              <a:t>7/9/2024</a:t>
+              <a:t>8/7/2024</a:t>
             </a:fld>
             <a:endParaRPr lang="en-US"/>
           </a:p>
@@ -2829,7 +2829,7 @@
           <a:p>
             <a:fld id="{0DEA2EF6-E32A-48A8-A702-35068FD5089A}" type="datetime1">
               <a:rPr lang="en-US" smtClean="0"/>
-              <a:t>7/9/2024</a:t>
+              <a:t>8/7/2024</a:t>
             </a:fld>
             <a:endParaRPr lang="en-US"/>
           </a:p>
@@ -3081,7 +3081,7 @@
           <a:p>
             <a:fld id="{C24B878A-5839-4166-A4B8-B74883100B26}" type="datetime1">
               <a:rPr lang="en-US" smtClean="0"/>
-              <a:t>7/9/2024</a:t>
+              <a:t>8/7/2024</a:t>
             </a:fld>
             <a:endParaRPr lang="en-US"/>
           </a:p>
@@ -3298,7 +3298,7 @@
           <a:p>
             <a:fld id="{F09FB937-D24B-4B25-846F-3F3FD7B91AF6}" type="datetime1">
               <a:rPr lang="en-US" smtClean="0"/>
-              <a:t>7/9/2024</a:t>
+              <a:t>8/7/2024</a:t>
             </a:fld>
             <a:endParaRPr lang="en-US"/>
           </a:p>
@@ -10463,7 +10463,26 @@
                 </a:highlight>
                 <a:latin typeface="Ubuntu" panose="020B0504030602030204" pitchFamily="34" charset="0"/>
               </a:rPr>
-              <a:t> bringing them closer to. This adjustment does not return them to their schedule immediately.</a:t>
+              <a:t> bringing them closer to schedule.</a:t>
+            </a:r>
+          </a:p>
+          <a:p>
+            <a:pPr lvl="1">
+              <a:buFont typeface="Arial" panose="020B0604020202020204" pitchFamily="34" charset="0"/>
+              <a:buChar char="•"/>
+            </a:pPr>
+            <a:r>
+              <a:rPr lang="en-US" b="0" i="0" dirty="0">
+                <a:solidFill>
+                  <a:srgbClr val="333333"/>
+                </a:solidFill>
+                <a:effectLst/>
+                <a:highlight>
+                  <a:srgbClr val="FFFFFF"/>
+                </a:highlight>
+                <a:latin typeface="Ubuntu" panose="020B0504030602030204" pitchFamily="34" charset="0"/>
+              </a:rPr>
+              <a:t> This adjustment does not return them to their schedule immediately.</a:t>
             </a:r>
           </a:p>
           <a:p>
@@ -11602,6 +11621,15 @@
 </file>
 
 <file path=customXml/item1.xml><?xml version="1.0" encoding="utf-8"?>
+<?mso-contentType ?>
+<FormTemplates xmlns="http://schemas.microsoft.com/sharepoint/v3/contenttype/forms">
+  <Display>DocumentLibraryForm</Display>
+  <Edit>DocumentLibraryForm</Edit>
+  <New>DocumentLibraryForm</New>
+</FormTemplates>
+</file>
+
+<file path=customXml/item2.xml><?xml version="1.0" encoding="utf-8"?>
 <ct:contentTypeSchema xmlns:ct="http://schemas.microsoft.com/office/2006/metadata/contentType" xmlns:ma="http://schemas.microsoft.com/office/2006/metadata/properties/metaAttributes" ct:_="" ma:_="" ma:contentTypeName="Document" ma:contentTypeID="0x010100F7C6AAA67F0B3747B37CF64B63DC9C45" ma:contentTypeVersion="9" ma:contentTypeDescription="Create a new document." ma:contentTypeScope="" ma:versionID="e637891b5a431308c468a13fe37db04a">
   <xsd:schema xmlns:xsd="http://www.w3.org/2001/XMLSchema" xmlns:xs="http://www.w3.org/2001/XMLSchema" xmlns:p="http://schemas.microsoft.com/office/2006/metadata/properties" xmlns:ns3="ad3a4da7-f67f-4905-80a2-006a786ead16" xmlns:ns4="fcd2ef7c-654d-4264-b5ff-18b31806136c" targetNamespace="http://schemas.microsoft.com/office/2006/metadata/properties" ma:root="true" ma:fieldsID="70529cdc41f0ce1676fe16e763d15ed0" ns3:_="" ns4:_="">
     <xsd:import namespace="ad3a4da7-f67f-4905-80a2-006a786ead16"/>
@@ -11796,15 +11824,6 @@
 </ct:contentTypeSchema>
 </file>
 
-<file path=customXml/item2.xml><?xml version="1.0" encoding="utf-8"?>
-<?mso-contentType ?>
-<FormTemplates xmlns="http://schemas.microsoft.com/sharepoint/v3/contenttype/forms">
-  <Display>DocumentLibraryForm</Display>
-  <Edit>DocumentLibraryForm</Edit>
-  <New>DocumentLibraryForm</New>
-</FormTemplates>
-</file>
-
 <file path=customXml/item3.xml><?xml version="1.0" encoding="utf-8"?>
 <p:properties xmlns:p="http://schemas.microsoft.com/office/2006/metadata/properties" xmlns:xsi="http://www.w3.org/2001/XMLSchema-instance" xmlns:pc="http://schemas.microsoft.com/office/infopath/2007/PartnerControls">
   <documentManagement>
@@ -11814,6 +11833,14 @@
 </file>
 
 <file path=customXml/itemProps1.xml><?xml version="1.0" encoding="utf-8"?>
+<ds:datastoreItem xmlns:ds="http://schemas.openxmlformats.org/officeDocument/2006/customXml" ds:itemID="{2636B3EA-AA71-4D96-B88F-7233026F2EFD}">
+  <ds:schemaRefs>
+    <ds:schemaRef ds:uri="http://schemas.microsoft.com/sharepoint/v3/contenttype/forms"/>
+  </ds:schemaRefs>
+</ds:datastoreItem>
+</file>
+
+<file path=customXml/itemProps2.xml><?xml version="1.0" encoding="utf-8"?>
 <ds:datastoreItem xmlns:ds="http://schemas.openxmlformats.org/officeDocument/2006/customXml" ds:itemID="{8CF908B5-E044-475D-BD99-03EC5AE5FFA0}">
   <ds:schemaRefs>
     <ds:schemaRef ds:uri="http://schemas.microsoft.com/office/2006/metadata/contentType"/>
@@ -11828,14 +11855,6 @@
     <ds:schemaRef ds:uri="http://purl.org/dc/elements/1.1/"/>
     <ds:schemaRef ds:uri="http://purl.org/dc/terms/"/>
     <ds:schemaRef ds:uri="http://schemas.microsoft.com/internal/obd"/>
-  </ds:schemaRefs>
-</ds:datastoreItem>
-</file>
-
-<file path=customXml/itemProps2.xml><?xml version="1.0" encoding="utf-8"?>
-<ds:datastoreItem xmlns:ds="http://schemas.openxmlformats.org/officeDocument/2006/customXml" ds:itemID="{2636B3EA-AA71-4D96-B88F-7233026F2EFD}">
-  <ds:schemaRefs>
-    <ds:schemaRef ds:uri="http://schemas.microsoft.com/sharepoint/v3/contenttype/forms"/>
   </ds:schemaRefs>
 </ds:datastoreItem>
 </file>

</xml_diff>